<commit_message>
fixed hero left-right flying animation
</commit_message>
<xml_diff>
--- a/Presentation.pptx
+++ b/Presentation.pptx
@@ -3091,11 +3091,7 @@
           <a:p>
             <a:r>
               <a:rPr lang="en-US" dirty="0" smtClean="0"/>
-              <a:t>~3min showing off extra </a:t>
-            </a:r>
-            <a:r>
-              <a:rPr lang="en-US" dirty="0" smtClean="0"/>
-              <a:t>features</a:t>
+              <a:t>~3min showing off extra features</a:t>
             </a:r>
           </a:p>
           <a:p>
@@ -3116,14 +3112,29 @@
             <a:pPr lvl="1"/>
             <a:r>
               <a:rPr lang="en-US" dirty="0" smtClean="0"/>
-              <a:t>Combo multiplier</a:t>
+              <a:t>Combo </a:t>
+            </a:r>
+            <a:r>
+              <a:rPr lang="en-US" dirty="0" smtClean="0"/>
+              <a:t>multiplier</a:t>
+            </a:r>
+          </a:p>
+          <a:p>
+            <a:pPr lvl="1"/>
+            <a:r>
+              <a:rPr lang="en-US" smtClean="0"/>
+              <a:t>Chicken.</a:t>
             </a:r>
             <a:endParaRPr lang="en-US" dirty="0" smtClean="0"/>
           </a:p>
           <a:p>
             <a:r>
               <a:rPr lang="en-US" dirty="0" smtClean="0"/>
-              <a:t>~5min explaining ONE technical decision in detail</a:t>
+              <a:t>~</a:t>
+            </a:r>
+            <a:r>
+              <a:rPr lang="en-US" dirty="0" smtClean="0"/>
+              <a:t>5min explaining ONE technical decision in detail</a:t>
             </a:r>
             <a:endParaRPr lang="en-US" dirty="0"/>
           </a:p>

</xml_diff>

<commit_message>
Fixed title slide typo
</commit_message>
<xml_diff>
--- a/Presentation.pptx
+++ b/Presentation.pptx
@@ -1,6 +1,6 @@
 
 <file path=ppt/presentation.xml><?xml version="1.0" encoding="utf-8"?>
-<p:presentation xmlns:a="http://schemas.openxmlformats.org/drawingml/2006/main" xmlns:r="http://schemas.openxmlformats.org/officeDocument/2006/relationships" xmlns:p="http://schemas.openxmlformats.org/presentationml/2006/main" saveSubsetFonts="1">
+<p:presentation xmlns:a="http://schemas.openxmlformats.org/drawingml/2006/main" xmlns:r="http://schemas.openxmlformats.org/officeDocument/2006/relationships" xmlns:p="http://schemas.openxmlformats.org/presentationml/2006/main" serverZoom="50214" saveSubsetFonts="1">
   <p:sldMasterIdLst>
     <p:sldMasterId id="2147483648" r:id="rId1"/>
   </p:sldMasterIdLst>
@@ -216,7 +216,7 @@
           <a:p>
             <a:fld id="{3DC47907-6A46-4095-AAF5-C58E214B7F47}" type="datetimeFigureOut">
               <a:rPr lang="en-US" smtClean="0"/>
-              <a:t>11/15/2019</a:t>
+              <a:t>7/25/2020</a:t>
             </a:fld>
             <a:endParaRPr lang="en-US"/>
           </a:p>
@@ -280,38 +280,37 @@
           <a:p>
             <a:pPr lvl="0"/>
             <a:r>
-              <a:rPr lang="en-US" smtClean="0"/>
+              <a:rPr lang="en-US"/>
               <a:t>Edit Master text styles</a:t>
             </a:r>
           </a:p>
           <a:p>
             <a:pPr lvl="1"/>
             <a:r>
-              <a:rPr lang="en-US" smtClean="0"/>
+              <a:rPr lang="en-US"/>
               <a:t>Second level</a:t>
             </a:r>
           </a:p>
           <a:p>
             <a:pPr lvl="2"/>
             <a:r>
-              <a:rPr lang="en-US" smtClean="0"/>
+              <a:rPr lang="en-US"/>
               <a:t>Third level</a:t>
             </a:r>
           </a:p>
           <a:p>
             <a:pPr lvl="3"/>
             <a:r>
-              <a:rPr lang="en-US" smtClean="0"/>
+              <a:rPr lang="en-US"/>
               <a:t>Fourth level</a:t>
             </a:r>
           </a:p>
           <a:p>
             <a:pPr lvl="4"/>
             <a:r>
-              <a:rPr lang="en-US" smtClean="0"/>
+              <a:rPr lang="en-US"/>
               <a:t>Fifth level</a:t>
             </a:r>
-            <a:endParaRPr lang="en-US"/>
           </a:p>
         </p:txBody>
       </p:sp>
@@ -696,30 +695,30 @@
           <a:bodyPr/>
           <a:lstStyle/>
           <a:p>
-            <a:endParaRPr lang="en-US" dirty="0" smtClean="0"/>
-          </a:p>
-          <a:p>
-            <a:r>
-              <a:rPr lang="en-US" dirty="0" smtClean="0"/>
+            <a:endParaRPr lang="en-US" dirty="0"/>
+          </a:p>
+          <a:p>
+            <a:r>
+              <a:rPr lang="en-US" dirty="0"/>
               <a:t>Fixed</a:t>
             </a:r>
             <a:r>
-              <a:rPr lang="en-US" baseline="0" dirty="0" smtClean="0"/>
+              <a:rPr lang="en-US" baseline="0" dirty="0"/>
               <a:t> by:</a:t>
             </a:r>
           </a:p>
           <a:p>
             <a:r>
-              <a:rPr lang="en-US" baseline="0" dirty="0" smtClean="0"/>
+              <a:rPr lang="en-US" baseline="0" dirty="0"/>
               <a:t>Check duplication is set and controlled inside “Multiplier”</a:t>
             </a:r>
           </a:p>
           <a:p>
             <a:r>
-              <a:rPr lang="en-US" baseline="0" dirty="0" smtClean="0"/>
+              <a:rPr lang="en-US" baseline="0" dirty="0"/>
               <a:t>Better design because important Multiplier data is no longer controlled by level</a:t>
             </a:r>
-            <a:endParaRPr lang="en-US" dirty="0" smtClean="0"/>
+            <a:endParaRPr lang="en-US" dirty="0"/>
           </a:p>
         </p:txBody>
       </p:sp>
@@ -801,10 +800,9 @@
           </a:lstStyle>
           <a:p>
             <a:r>
-              <a:rPr lang="en-US" smtClean="0"/>
+              <a:rPr lang="en-US"/>
               <a:t>Click to edit Master title style</a:t>
             </a:r>
-            <a:endParaRPr lang="en-US"/>
           </a:p>
         </p:txBody>
       </p:sp>
@@ -866,10 +864,9 @@
           </a:lstStyle>
           <a:p>
             <a:r>
-              <a:rPr lang="en-US" smtClean="0"/>
+              <a:rPr lang="en-US"/>
               <a:t>Click to edit Master subtitle style</a:t>
             </a:r>
-            <a:endParaRPr lang="en-US"/>
           </a:p>
         </p:txBody>
       </p:sp>
@@ -890,7 +887,7 @@
           <a:p>
             <a:fld id="{0533F43A-018E-4957-8DDF-E1823C3A8838}" type="datetimeFigureOut">
               <a:rPr lang="en-US" smtClean="0"/>
-              <a:t>11/15/2019</a:t>
+              <a:t>7/25/2020</a:t>
             </a:fld>
             <a:endParaRPr lang="en-US"/>
           </a:p>
@@ -984,10 +981,9 @@
           <a:lstStyle/>
           <a:p>
             <a:r>
-              <a:rPr lang="en-US" smtClean="0"/>
+              <a:rPr lang="en-US"/>
               <a:t>Click to edit Master title style</a:t>
             </a:r>
-            <a:endParaRPr lang="en-US"/>
           </a:p>
         </p:txBody>
       </p:sp>
@@ -1008,38 +1004,37 @@
           <a:p>
             <a:pPr lvl="0"/>
             <a:r>
-              <a:rPr lang="en-US" smtClean="0"/>
+              <a:rPr lang="en-US"/>
               <a:t>Edit Master text styles</a:t>
             </a:r>
           </a:p>
           <a:p>
             <a:pPr lvl="1"/>
             <a:r>
-              <a:rPr lang="en-US" smtClean="0"/>
+              <a:rPr lang="en-US"/>
               <a:t>Second level</a:t>
             </a:r>
           </a:p>
           <a:p>
             <a:pPr lvl="2"/>
             <a:r>
-              <a:rPr lang="en-US" smtClean="0"/>
+              <a:rPr lang="en-US"/>
               <a:t>Third level</a:t>
             </a:r>
           </a:p>
           <a:p>
             <a:pPr lvl="3"/>
             <a:r>
-              <a:rPr lang="en-US" smtClean="0"/>
+              <a:rPr lang="en-US"/>
               <a:t>Fourth level</a:t>
             </a:r>
           </a:p>
           <a:p>
             <a:pPr lvl="4"/>
             <a:r>
-              <a:rPr lang="en-US" smtClean="0"/>
+              <a:rPr lang="en-US"/>
               <a:t>Fifth level</a:t>
             </a:r>
-            <a:endParaRPr lang="en-US"/>
           </a:p>
         </p:txBody>
       </p:sp>
@@ -1060,7 +1055,7 @@
           <a:p>
             <a:fld id="{0533F43A-018E-4957-8DDF-E1823C3A8838}" type="datetimeFigureOut">
               <a:rPr lang="en-US" smtClean="0"/>
-              <a:t>11/15/2019</a:t>
+              <a:t>7/25/2020</a:t>
             </a:fld>
             <a:endParaRPr lang="en-US"/>
           </a:p>
@@ -1159,10 +1154,9 @@
           <a:lstStyle/>
           <a:p>
             <a:r>
-              <a:rPr lang="en-US" smtClean="0"/>
+              <a:rPr lang="en-US"/>
               <a:t>Click to edit Master title style</a:t>
             </a:r>
-            <a:endParaRPr lang="en-US"/>
           </a:p>
         </p:txBody>
       </p:sp>
@@ -1188,38 +1182,37 @@
           <a:p>
             <a:pPr lvl="0"/>
             <a:r>
-              <a:rPr lang="en-US" smtClean="0"/>
+              <a:rPr lang="en-US"/>
               <a:t>Edit Master text styles</a:t>
             </a:r>
           </a:p>
           <a:p>
             <a:pPr lvl="1"/>
             <a:r>
-              <a:rPr lang="en-US" smtClean="0"/>
+              <a:rPr lang="en-US"/>
               <a:t>Second level</a:t>
             </a:r>
           </a:p>
           <a:p>
             <a:pPr lvl="2"/>
             <a:r>
-              <a:rPr lang="en-US" smtClean="0"/>
+              <a:rPr lang="en-US"/>
               <a:t>Third level</a:t>
             </a:r>
           </a:p>
           <a:p>
             <a:pPr lvl="3"/>
             <a:r>
-              <a:rPr lang="en-US" smtClean="0"/>
+              <a:rPr lang="en-US"/>
               <a:t>Fourth level</a:t>
             </a:r>
           </a:p>
           <a:p>
             <a:pPr lvl="4"/>
             <a:r>
-              <a:rPr lang="en-US" smtClean="0"/>
+              <a:rPr lang="en-US"/>
               <a:t>Fifth level</a:t>
             </a:r>
-            <a:endParaRPr lang="en-US"/>
           </a:p>
         </p:txBody>
       </p:sp>
@@ -1240,7 +1233,7 @@
           <a:p>
             <a:fld id="{0533F43A-018E-4957-8DDF-E1823C3A8838}" type="datetimeFigureOut">
               <a:rPr lang="en-US" smtClean="0"/>
-              <a:t>11/15/2019</a:t>
+              <a:t>7/25/2020</a:t>
             </a:fld>
             <a:endParaRPr lang="en-US"/>
           </a:p>
@@ -1334,10 +1327,9 @@
           <a:lstStyle/>
           <a:p>
             <a:r>
-              <a:rPr lang="en-US" smtClean="0"/>
+              <a:rPr lang="en-US"/>
               <a:t>Click to edit Master title style</a:t>
             </a:r>
-            <a:endParaRPr lang="en-US"/>
           </a:p>
         </p:txBody>
       </p:sp>
@@ -1358,38 +1350,37 @@
           <a:p>
             <a:pPr lvl="0"/>
             <a:r>
-              <a:rPr lang="en-US" smtClean="0"/>
+              <a:rPr lang="en-US"/>
               <a:t>Edit Master text styles</a:t>
             </a:r>
           </a:p>
           <a:p>
             <a:pPr lvl="1"/>
             <a:r>
-              <a:rPr lang="en-US" smtClean="0"/>
+              <a:rPr lang="en-US"/>
               <a:t>Second level</a:t>
             </a:r>
           </a:p>
           <a:p>
             <a:pPr lvl="2"/>
             <a:r>
-              <a:rPr lang="en-US" smtClean="0"/>
+              <a:rPr lang="en-US"/>
               <a:t>Third level</a:t>
             </a:r>
           </a:p>
           <a:p>
             <a:pPr lvl="3"/>
             <a:r>
-              <a:rPr lang="en-US" smtClean="0"/>
+              <a:rPr lang="en-US"/>
               <a:t>Fourth level</a:t>
             </a:r>
           </a:p>
           <a:p>
             <a:pPr lvl="4"/>
             <a:r>
-              <a:rPr lang="en-US" smtClean="0"/>
+              <a:rPr lang="en-US"/>
               <a:t>Fifth level</a:t>
             </a:r>
-            <a:endParaRPr lang="en-US"/>
           </a:p>
         </p:txBody>
       </p:sp>
@@ -1410,7 +1401,7 @@
           <a:p>
             <a:fld id="{0533F43A-018E-4957-8DDF-E1823C3A8838}" type="datetimeFigureOut">
               <a:rPr lang="en-US" smtClean="0"/>
-              <a:t>11/15/2019</a:t>
+              <a:t>7/25/2020</a:t>
             </a:fld>
             <a:endParaRPr lang="en-US"/>
           </a:p>
@@ -1513,10 +1504,9 @@
           </a:lstStyle>
           <a:p>
             <a:r>
-              <a:rPr lang="en-US" smtClean="0"/>
+              <a:rPr lang="en-US"/>
               <a:t>Click to edit Master title style</a:t>
             </a:r>
-            <a:endParaRPr lang="en-US"/>
           </a:p>
         </p:txBody>
       </p:sp>
@@ -1633,7 +1623,7 @@
           <a:p>
             <a:pPr lvl="0"/>
             <a:r>
-              <a:rPr lang="en-US" smtClean="0"/>
+              <a:rPr lang="en-US"/>
               <a:t>Edit Master text styles</a:t>
             </a:r>
           </a:p>
@@ -1656,7 +1646,7 @@
           <a:p>
             <a:fld id="{0533F43A-018E-4957-8DDF-E1823C3A8838}" type="datetimeFigureOut">
               <a:rPr lang="en-US" smtClean="0"/>
-              <a:t>11/15/2019</a:t>
+              <a:t>7/25/2020</a:t>
             </a:fld>
             <a:endParaRPr lang="en-US"/>
           </a:p>
@@ -1750,10 +1740,9 @@
           <a:lstStyle/>
           <a:p>
             <a:r>
-              <a:rPr lang="en-US" smtClean="0"/>
+              <a:rPr lang="en-US"/>
               <a:t>Click to edit Master title style</a:t>
             </a:r>
-            <a:endParaRPr lang="en-US"/>
           </a:p>
         </p:txBody>
       </p:sp>
@@ -1779,38 +1768,37 @@
           <a:p>
             <a:pPr lvl="0"/>
             <a:r>
-              <a:rPr lang="en-US" smtClean="0"/>
+              <a:rPr lang="en-US"/>
               <a:t>Edit Master text styles</a:t>
             </a:r>
           </a:p>
           <a:p>
             <a:pPr lvl="1"/>
             <a:r>
-              <a:rPr lang="en-US" smtClean="0"/>
+              <a:rPr lang="en-US"/>
               <a:t>Second level</a:t>
             </a:r>
           </a:p>
           <a:p>
             <a:pPr lvl="2"/>
             <a:r>
-              <a:rPr lang="en-US" smtClean="0"/>
+              <a:rPr lang="en-US"/>
               <a:t>Third level</a:t>
             </a:r>
           </a:p>
           <a:p>
             <a:pPr lvl="3"/>
             <a:r>
-              <a:rPr lang="en-US" smtClean="0"/>
+              <a:rPr lang="en-US"/>
               <a:t>Fourth level</a:t>
             </a:r>
           </a:p>
           <a:p>
             <a:pPr lvl="4"/>
             <a:r>
-              <a:rPr lang="en-US" smtClean="0"/>
+              <a:rPr lang="en-US"/>
               <a:t>Fifth level</a:t>
             </a:r>
-            <a:endParaRPr lang="en-US"/>
           </a:p>
         </p:txBody>
       </p:sp>
@@ -1836,38 +1824,37 @@
           <a:p>
             <a:pPr lvl="0"/>
             <a:r>
-              <a:rPr lang="en-US" smtClean="0"/>
+              <a:rPr lang="en-US"/>
               <a:t>Edit Master text styles</a:t>
             </a:r>
           </a:p>
           <a:p>
             <a:pPr lvl="1"/>
             <a:r>
-              <a:rPr lang="en-US" smtClean="0"/>
+              <a:rPr lang="en-US"/>
               <a:t>Second level</a:t>
             </a:r>
           </a:p>
           <a:p>
             <a:pPr lvl="2"/>
             <a:r>
-              <a:rPr lang="en-US" smtClean="0"/>
+              <a:rPr lang="en-US"/>
               <a:t>Third level</a:t>
             </a:r>
           </a:p>
           <a:p>
             <a:pPr lvl="3"/>
             <a:r>
-              <a:rPr lang="en-US" smtClean="0"/>
+              <a:rPr lang="en-US"/>
               <a:t>Fourth level</a:t>
             </a:r>
           </a:p>
           <a:p>
             <a:pPr lvl="4"/>
             <a:r>
-              <a:rPr lang="en-US" smtClean="0"/>
+              <a:rPr lang="en-US"/>
               <a:t>Fifth level</a:t>
             </a:r>
-            <a:endParaRPr lang="en-US"/>
           </a:p>
         </p:txBody>
       </p:sp>
@@ -1888,7 +1875,7 @@
           <a:p>
             <a:fld id="{0533F43A-018E-4957-8DDF-E1823C3A8838}" type="datetimeFigureOut">
               <a:rPr lang="en-US" smtClean="0"/>
-              <a:t>11/15/2019</a:t>
+              <a:t>7/25/2020</a:t>
             </a:fld>
             <a:endParaRPr lang="en-US"/>
           </a:p>
@@ -1987,10 +1974,9 @@
           <a:lstStyle/>
           <a:p>
             <a:r>
-              <a:rPr lang="en-US" smtClean="0"/>
+              <a:rPr lang="en-US"/>
               <a:t>Click to edit Master title style</a:t>
             </a:r>
-            <a:endParaRPr lang="en-US"/>
           </a:p>
         </p:txBody>
       </p:sp>
@@ -2053,7 +2039,7 @@
           <a:p>
             <a:pPr lvl="0"/>
             <a:r>
-              <a:rPr lang="en-US" smtClean="0"/>
+              <a:rPr lang="en-US"/>
               <a:t>Edit Master text styles</a:t>
             </a:r>
           </a:p>
@@ -2081,38 +2067,37 @@
           <a:p>
             <a:pPr lvl="0"/>
             <a:r>
-              <a:rPr lang="en-US" smtClean="0"/>
+              <a:rPr lang="en-US"/>
               <a:t>Edit Master text styles</a:t>
             </a:r>
           </a:p>
           <a:p>
             <a:pPr lvl="1"/>
             <a:r>
-              <a:rPr lang="en-US" smtClean="0"/>
+              <a:rPr lang="en-US"/>
               <a:t>Second level</a:t>
             </a:r>
           </a:p>
           <a:p>
             <a:pPr lvl="2"/>
             <a:r>
-              <a:rPr lang="en-US" smtClean="0"/>
+              <a:rPr lang="en-US"/>
               <a:t>Third level</a:t>
             </a:r>
           </a:p>
           <a:p>
             <a:pPr lvl="3"/>
             <a:r>
-              <a:rPr lang="en-US" smtClean="0"/>
+              <a:rPr lang="en-US"/>
               <a:t>Fourth level</a:t>
             </a:r>
           </a:p>
           <a:p>
             <a:pPr lvl="4"/>
             <a:r>
-              <a:rPr lang="en-US" smtClean="0"/>
+              <a:rPr lang="en-US"/>
               <a:t>Fifth level</a:t>
             </a:r>
-            <a:endParaRPr lang="en-US"/>
           </a:p>
         </p:txBody>
       </p:sp>
@@ -2175,7 +2160,7 @@
           <a:p>
             <a:pPr lvl="0"/>
             <a:r>
-              <a:rPr lang="en-US" smtClean="0"/>
+              <a:rPr lang="en-US"/>
               <a:t>Edit Master text styles</a:t>
             </a:r>
           </a:p>
@@ -2203,38 +2188,37 @@
           <a:p>
             <a:pPr lvl="0"/>
             <a:r>
-              <a:rPr lang="en-US" smtClean="0"/>
+              <a:rPr lang="en-US"/>
               <a:t>Edit Master text styles</a:t>
             </a:r>
           </a:p>
           <a:p>
             <a:pPr lvl="1"/>
             <a:r>
-              <a:rPr lang="en-US" smtClean="0"/>
+              <a:rPr lang="en-US"/>
               <a:t>Second level</a:t>
             </a:r>
           </a:p>
           <a:p>
             <a:pPr lvl="2"/>
             <a:r>
-              <a:rPr lang="en-US" smtClean="0"/>
+              <a:rPr lang="en-US"/>
               <a:t>Third level</a:t>
             </a:r>
           </a:p>
           <a:p>
             <a:pPr lvl="3"/>
             <a:r>
-              <a:rPr lang="en-US" smtClean="0"/>
+              <a:rPr lang="en-US"/>
               <a:t>Fourth level</a:t>
             </a:r>
           </a:p>
           <a:p>
             <a:pPr lvl="4"/>
             <a:r>
-              <a:rPr lang="en-US" smtClean="0"/>
+              <a:rPr lang="en-US"/>
               <a:t>Fifth level</a:t>
             </a:r>
-            <a:endParaRPr lang="en-US"/>
           </a:p>
         </p:txBody>
       </p:sp>
@@ -2255,7 +2239,7 @@
           <a:p>
             <a:fld id="{0533F43A-018E-4957-8DDF-E1823C3A8838}" type="datetimeFigureOut">
               <a:rPr lang="en-US" smtClean="0"/>
-              <a:t>11/15/2019</a:t>
+              <a:t>7/25/2020</a:t>
             </a:fld>
             <a:endParaRPr lang="en-US"/>
           </a:p>
@@ -2349,10 +2333,9 @@
           <a:lstStyle/>
           <a:p>
             <a:r>
-              <a:rPr lang="en-US" smtClean="0"/>
+              <a:rPr lang="en-US"/>
               <a:t>Click to edit Master title style</a:t>
             </a:r>
-            <a:endParaRPr lang="en-US"/>
           </a:p>
         </p:txBody>
       </p:sp>
@@ -2373,7 +2356,7 @@
           <a:p>
             <a:fld id="{0533F43A-018E-4957-8DDF-E1823C3A8838}" type="datetimeFigureOut">
               <a:rPr lang="en-US" smtClean="0"/>
-              <a:t>11/15/2019</a:t>
+              <a:t>7/25/2020</a:t>
             </a:fld>
             <a:endParaRPr lang="en-US"/>
           </a:p>
@@ -2468,7 +2451,7 @@
           <a:p>
             <a:fld id="{0533F43A-018E-4957-8DDF-E1823C3A8838}" type="datetimeFigureOut">
               <a:rPr lang="en-US" smtClean="0"/>
-              <a:t>11/15/2019</a:t>
+              <a:t>7/25/2020</a:t>
             </a:fld>
             <a:endParaRPr lang="en-US"/>
           </a:p>
@@ -2571,10 +2554,9 @@
           </a:lstStyle>
           <a:p>
             <a:r>
-              <a:rPr lang="en-US" smtClean="0"/>
+              <a:rPr lang="en-US"/>
               <a:t>Click to edit Master title style</a:t>
             </a:r>
-            <a:endParaRPr lang="en-US"/>
           </a:p>
         </p:txBody>
       </p:sp>
@@ -2628,38 +2610,37 @@
           <a:p>
             <a:pPr lvl="0"/>
             <a:r>
-              <a:rPr lang="en-US" smtClean="0"/>
+              <a:rPr lang="en-US"/>
               <a:t>Edit Master text styles</a:t>
             </a:r>
           </a:p>
           <a:p>
             <a:pPr lvl="1"/>
             <a:r>
-              <a:rPr lang="en-US" smtClean="0"/>
+              <a:rPr lang="en-US"/>
               <a:t>Second level</a:t>
             </a:r>
           </a:p>
           <a:p>
             <a:pPr lvl="2"/>
             <a:r>
-              <a:rPr lang="en-US" smtClean="0"/>
+              <a:rPr lang="en-US"/>
               <a:t>Third level</a:t>
             </a:r>
           </a:p>
           <a:p>
             <a:pPr lvl="3"/>
             <a:r>
-              <a:rPr lang="en-US" smtClean="0"/>
+              <a:rPr lang="en-US"/>
               <a:t>Fourth level</a:t>
             </a:r>
           </a:p>
           <a:p>
             <a:pPr lvl="4"/>
             <a:r>
-              <a:rPr lang="en-US" smtClean="0"/>
+              <a:rPr lang="en-US"/>
               <a:t>Fifth level</a:t>
             </a:r>
-            <a:endParaRPr lang="en-US"/>
           </a:p>
         </p:txBody>
       </p:sp>
@@ -2722,7 +2703,7 @@
           <a:p>
             <a:pPr lvl="0"/>
             <a:r>
-              <a:rPr lang="en-US" smtClean="0"/>
+              <a:rPr lang="en-US"/>
               <a:t>Edit Master text styles</a:t>
             </a:r>
           </a:p>
@@ -2745,7 +2726,7 @@
           <a:p>
             <a:fld id="{0533F43A-018E-4957-8DDF-E1823C3A8838}" type="datetimeFigureOut">
               <a:rPr lang="en-US" smtClean="0"/>
-              <a:t>11/15/2019</a:t>
+              <a:t>7/25/2020</a:t>
             </a:fld>
             <a:endParaRPr lang="en-US"/>
           </a:p>
@@ -2848,10 +2829,9 @@
           </a:lstStyle>
           <a:p>
             <a:r>
-              <a:rPr lang="en-US" smtClean="0"/>
+              <a:rPr lang="en-US"/>
               <a:t>Click to edit Master title style</a:t>
             </a:r>
-            <a:endParaRPr lang="en-US"/>
           </a:p>
         </p:txBody>
       </p:sp>
@@ -2975,7 +2955,7 @@
           <a:p>
             <a:pPr lvl="0"/>
             <a:r>
-              <a:rPr lang="en-US" smtClean="0"/>
+              <a:rPr lang="en-US"/>
               <a:t>Edit Master text styles</a:t>
             </a:r>
           </a:p>
@@ -2998,7 +2978,7 @@
           <a:p>
             <a:fld id="{0533F43A-018E-4957-8DDF-E1823C3A8838}" type="datetimeFigureOut">
               <a:rPr lang="en-US" smtClean="0"/>
-              <a:t>11/15/2019</a:t>
+              <a:t>7/25/2020</a:t>
             </a:fld>
             <a:endParaRPr lang="en-US"/>
           </a:p>
@@ -3107,10 +3087,9 @@
           <a:lstStyle/>
           <a:p>
             <a:r>
-              <a:rPr lang="en-US" smtClean="0"/>
+              <a:rPr lang="en-US"/>
               <a:t>Click to edit Master title style</a:t>
             </a:r>
-            <a:endParaRPr lang="en-US"/>
           </a:p>
         </p:txBody>
       </p:sp>
@@ -3141,38 +3120,37 @@
           <a:p>
             <a:pPr lvl="0"/>
             <a:r>
-              <a:rPr lang="en-US" smtClean="0"/>
+              <a:rPr lang="en-US"/>
               <a:t>Edit Master text styles</a:t>
             </a:r>
           </a:p>
           <a:p>
             <a:pPr lvl="1"/>
             <a:r>
-              <a:rPr lang="en-US" smtClean="0"/>
+              <a:rPr lang="en-US"/>
               <a:t>Second level</a:t>
             </a:r>
           </a:p>
           <a:p>
             <a:pPr lvl="2"/>
             <a:r>
-              <a:rPr lang="en-US" smtClean="0"/>
+              <a:rPr lang="en-US"/>
               <a:t>Third level</a:t>
             </a:r>
           </a:p>
           <a:p>
             <a:pPr lvl="3"/>
             <a:r>
-              <a:rPr lang="en-US" smtClean="0"/>
+              <a:rPr lang="en-US"/>
               <a:t>Fourth level</a:t>
             </a:r>
           </a:p>
           <a:p>
             <a:pPr lvl="4"/>
             <a:r>
-              <a:rPr lang="en-US" smtClean="0"/>
+              <a:rPr lang="en-US"/>
               <a:t>Fifth level</a:t>
             </a:r>
-            <a:endParaRPr lang="en-US"/>
           </a:p>
         </p:txBody>
       </p:sp>
@@ -3211,7 +3189,7 @@
           <a:p>
             <a:fld id="{0533F43A-018E-4957-8DDF-E1823C3A8838}" type="datetimeFigureOut">
               <a:rPr lang="en-US" smtClean="0"/>
-              <a:t>11/15/2019</a:t>
+              <a:t>7/25/2020</a:t>
             </a:fld>
             <a:endParaRPr lang="en-US"/>
           </a:p>
@@ -3669,14 +3647,11 @@
           <a:lstStyle/>
           <a:p>
             <a:r>
-              <a:rPr lang="en-US" sz="9600" dirty="0" smtClean="0">
+              <a:rPr lang="en-US" sz="9600" dirty="0">
                 <a:latin typeface="Agency FB" panose="020B0503020202020204" pitchFamily="34" charset="0"/>
               </a:rPr>
               <a:t>Jetpack Joust</a:t>
             </a:r>
-            <a:endParaRPr lang="en-US" sz="9600" dirty="0">
-              <a:latin typeface="Agency FB" panose="020B0503020202020204" pitchFamily="34" charset="0"/>
-            </a:endParaRPr>
           </a:p>
         </p:txBody>
       </p:sp>
@@ -3703,7 +3678,7 @@
           <a:lstStyle/>
           <a:p>
             <a:r>
-              <a:rPr lang="en-US" sz="3600" dirty="0" smtClean="0">
+              <a:rPr lang="en-US" sz="3600" dirty="0">
                 <a:latin typeface="Agency FB" panose="020B0503020202020204" pitchFamily="34" charset="0"/>
               </a:rPr>
               <a:t>Kyle Brown</a:t>
@@ -3711,13 +3686,13 @@
           </a:p>
           <a:p>
             <a:r>
-              <a:rPr lang="en-US" sz="3600" dirty="0" smtClean="0">
+              <a:rPr lang="en-US" sz="3600" dirty="0">
                 <a:latin typeface="Agency FB" panose="020B0503020202020204" pitchFamily="34" charset="0"/>
               </a:rPr>
               <a:t>Seth </a:t>
             </a:r>
             <a:r>
-              <a:rPr lang="en-US" sz="3600" dirty="0" err="1" smtClean="0">
+              <a:rPr lang="en-US" sz="3600" dirty="0" err="1">
                 <a:latin typeface="Agency FB" panose="020B0503020202020204" pitchFamily="34" charset="0"/>
               </a:rPr>
               <a:t>Lakstins</a:t>
@@ -3738,13 +3713,6 @@
   <p:clrMapOvr>
     <a:masterClrMapping/>
   </p:clrMapOvr>
-  <p:timing>
-    <p:tnLst>
-      <p:par>
-        <p:cTn id="1" dur="indefinite" restart="never" nodeType="tmRoot"/>
-      </p:par>
-    </p:tnLst>
-  </p:timing>
 </p:sld>
 </file>
 
@@ -3783,14 +3751,11 @@
           <a:lstStyle/>
           <a:p>
             <a:r>
-              <a:rPr lang="en-US" sz="7200" dirty="0" smtClean="0">
+              <a:rPr lang="en-US" sz="7200" dirty="0">
                 <a:latin typeface="Agency FB" panose="020B0503020202020204" pitchFamily="34" charset="0"/>
               </a:rPr>
               <a:t>Animations</a:t>
             </a:r>
-            <a:endParaRPr lang="en-US" sz="7200" dirty="0">
-              <a:latin typeface="Agency FB" panose="020B0503020202020204" pitchFamily="34" charset="0"/>
-            </a:endParaRPr>
           </a:p>
         </p:txBody>
       </p:sp>
@@ -4482,7 +4447,7 @@
           <a:lstStyle/>
           <a:p>
             <a:r>
-              <a:rPr lang="en-US" sz="7200" dirty="0" smtClean="0">
+              <a:rPr lang="en-US" sz="7200" dirty="0">
                 <a:solidFill>
                   <a:prstClr val="black"/>
                 </a:solidFill>
@@ -4504,13 +4469,6 @@
   <p:clrMapOvr>
     <a:masterClrMapping/>
   </p:clrMapOvr>
-  <p:timing>
-    <p:tnLst>
-      <p:par>
-        <p:cTn id="1" dur="indefinite" restart="never" nodeType="tmRoot"/>
-      </p:par>
-    </p:tnLst>
-  </p:timing>
 </p:sld>
 </file>
 
@@ -4547,7 +4505,7 @@
           <a:lstStyle/>
           <a:p>
             <a:r>
-              <a:rPr lang="en-US" sz="7200" dirty="0" smtClean="0">
+              <a:rPr lang="en-US" sz="7200" dirty="0">
                 <a:solidFill>
                   <a:prstClr val="black"/>
                 </a:solidFill>
@@ -4692,13 +4650,6 @@
   <p:clrMapOvr>
     <a:masterClrMapping/>
   </p:clrMapOvr>
-  <p:timing>
-    <p:tnLst>
-      <p:par>
-        <p:cTn id="1" dur="indefinite" restart="never" nodeType="tmRoot"/>
-      </p:par>
-    </p:tnLst>
-  </p:timing>
 </p:sld>
 </file>
 
@@ -4758,7 +4709,7 @@
           <a:lstStyle/>
           <a:p>
             <a:r>
-              <a:rPr lang="en-US" sz="7200" dirty="0" smtClean="0">
+              <a:rPr lang="en-US" sz="7200" dirty="0">
                 <a:solidFill>
                   <a:prstClr val="black"/>
                 </a:solidFill>
@@ -4780,13 +4731,6 @@
   <p:clrMapOvr>
     <a:masterClrMapping/>
   </p:clrMapOvr>
-  <p:timing>
-    <p:tnLst>
-      <p:par>
-        <p:cTn id="1" dur="indefinite" restart="never" nodeType="tmRoot"/>
-      </p:par>
-    </p:tnLst>
-  </p:timing>
 </p:sld>
 </file>
 
@@ -4841,13 +4785,6 @@
   <p:clrMapOvr>
     <a:masterClrMapping/>
   </p:clrMapOvr>
-  <p:timing>
-    <p:tnLst>
-      <p:par>
-        <p:cTn id="1" dur="indefinite" restart="never" nodeType="tmRoot"/>
-      </p:par>
-    </p:tnLst>
-  </p:timing>
 </p:sld>
 </file>
 
@@ -5086,13 +5023,6 @@
   <p:clrMapOvr>
     <a:masterClrMapping/>
   </p:clrMapOvr>
-  <p:timing>
-    <p:tnLst>
-      <p:par>
-        <p:cTn id="1" dur="indefinite" restart="never" nodeType="tmRoot"/>
-      </p:par>
-    </p:tnLst>
-  </p:timing>
 </p:sld>
 </file>
 
@@ -5260,7 +5190,7 @@
           <a:lstStyle/>
           <a:p>
             <a:r>
-              <a:rPr lang="en-US" sz="7200" dirty="0" smtClean="0">
+              <a:rPr lang="en-US" sz="7200" dirty="0">
                 <a:solidFill>
                   <a:prstClr val="black"/>
                 </a:solidFill>
@@ -5291,10 +5221,9 @@
               <a:buNone/>
             </a:pPr>
             <a:r>
-              <a:rPr lang="en-US" dirty="0" smtClean="0"/>
+              <a:rPr lang="en-US" dirty="0"/>
               <a:t> </a:t>
             </a:r>
-            <a:endParaRPr lang="en-US" dirty="0"/>
           </a:p>
         </p:txBody>
       </p:sp>
@@ -5308,13 +5237,6 @@
   <p:clrMapOvr>
     <a:masterClrMapping/>
   </p:clrMapOvr>
-  <p:timing>
-    <p:tnLst>
-      <p:par>
-        <p:cTn id="1" dur="indefinite" restart="never" nodeType="tmRoot"/>
-      </p:par>
-    </p:tnLst>
-  </p:timing>
 </p:sld>
 </file>
 
@@ -5351,7 +5273,7 @@
           <a:lstStyle/>
           <a:p>
             <a:r>
-              <a:rPr lang="en-US" sz="7200" dirty="0" smtClean="0">
+              <a:rPr lang="en-US" sz="7200" dirty="0">
                 <a:solidFill>
                   <a:prstClr val="black"/>
                 </a:solidFill>
@@ -6647,10 +6569,9 @@
           <a:lstStyle/>
           <a:p>
             <a:r>
-              <a:rPr lang="en-US" sz="2400" dirty="0" smtClean="0"/>
+              <a:rPr lang="en-US" sz="2400" dirty="0"/>
               <a:t>BEFORE</a:t>
             </a:r>
-            <a:endParaRPr lang="en-US" sz="2400" dirty="0"/>
           </a:p>
         </p:txBody>
       </p:sp>
@@ -6677,10 +6598,9 @@
           <a:lstStyle/>
           <a:p>
             <a:r>
-              <a:rPr lang="en-US" sz="2400" dirty="0" smtClean="0"/>
+              <a:rPr lang="en-US" sz="2400" dirty="0"/>
               <a:t>AFTER</a:t>
             </a:r>
-            <a:endParaRPr lang="en-US" sz="2400" dirty="0"/>
           </a:p>
         </p:txBody>
       </p:sp>
@@ -6694,13 +6614,6 @@
   <p:clrMapOvr>
     <a:masterClrMapping/>
   </p:clrMapOvr>
-  <p:timing>
-    <p:tnLst>
-      <p:par>
-        <p:cTn id="1" dur="indefinite" restart="never" nodeType="tmRoot"/>
-      </p:par>
-    </p:tnLst>
-  </p:timing>
 </p:sld>
 </file>
 

</xml_diff>